<commit_message>
Fixed tests to reflect keyword position change from notes slide to standard slide
</commit_message>
<xml_diff>
--- a/Test/RepeatedKeywordsDifferentPresentations/Presentation1.pptx
+++ b/Test/RepeatedKeywordsDifferentPresentations/Presentation1.pptx
@@ -199,7 +199,7 @@
           <a:p>
             <a:fld id="{C956ED17-90B8-4DC4-AED5-46EE3B09F75A}" type="datetimeFigureOut">
               <a:rPr lang="en-US" smtClean="0"/>
-              <a:t>8/22/2020</a:t>
+              <a:t>8/29/2020</a:t>
             </a:fld>
             <a:endParaRPr lang="en-US"/>
           </a:p>
@@ -510,10 +510,7 @@
           <a:bodyPr/>
           <a:lstStyle/>
           <a:p>
-            <a:r>
-              <a:rPr lang="en-US" dirty="0"/>
-              <a:t>Keyword1, Keyword2, Keyword3, Keyword4 Keyword5</a:t>
-            </a:r>
+            <a:endParaRPr lang="en-US" dirty="0"/>
           </a:p>
         </p:txBody>
       </p:sp>
@@ -597,10 +594,6 @@
           <a:bodyPr/>
           <a:lstStyle/>
           <a:p>
-            <a:r>
-              <a:rPr lang="en-US"/>
-              <a:t>Keyword3</a:t>
-            </a:r>
             <a:endParaRPr lang="en-US" dirty="0"/>
           </a:p>
         </p:txBody>
@@ -788,7 +781,7 @@
           <a:p>
             <a:fld id="{05D3A4E8-AB20-43C8-A6A8-E7249BC0FC39}" type="datetimeFigureOut">
               <a:rPr lang="en-US" smtClean="0"/>
-              <a:t>8/22/2020</a:t>
+              <a:t>8/29/2020</a:t>
             </a:fld>
             <a:endParaRPr lang="en-US"/>
           </a:p>
@@ -986,7 +979,7 @@
           <a:p>
             <a:fld id="{05D3A4E8-AB20-43C8-A6A8-E7249BC0FC39}" type="datetimeFigureOut">
               <a:rPr lang="en-US" smtClean="0"/>
-              <a:t>8/22/2020</a:t>
+              <a:t>8/29/2020</a:t>
             </a:fld>
             <a:endParaRPr lang="en-US"/>
           </a:p>
@@ -1194,7 +1187,7 @@
           <a:p>
             <a:fld id="{05D3A4E8-AB20-43C8-A6A8-E7249BC0FC39}" type="datetimeFigureOut">
               <a:rPr lang="en-US" smtClean="0"/>
-              <a:t>8/22/2020</a:t>
+              <a:t>8/29/2020</a:t>
             </a:fld>
             <a:endParaRPr lang="en-US"/>
           </a:p>
@@ -1392,7 +1385,7 @@
           <a:p>
             <a:fld id="{05D3A4E8-AB20-43C8-A6A8-E7249BC0FC39}" type="datetimeFigureOut">
               <a:rPr lang="en-US" smtClean="0"/>
-              <a:t>8/22/2020</a:t>
+              <a:t>8/29/2020</a:t>
             </a:fld>
             <a:endParaRPr lang="en-US"/>
           </a:p>
@@ -1667,7 +1660,7 @@
           <a:p>
             <a:fld id="{05D3A4E8-AB20-43C8-A6A8-E7249BC0FC39}" type="datetimeFigureOut">
               <a:rPr lang="en-US" smtClean="0"/>
-              <a:t>8/22/2020</a:t>
+              <a:t>8/29/2020</a:t>
             </a:fld>
             <a:endParaRPr lang="en-US"/>
           </a:p>
@@ -1932,7 +1925,7 @@
           <a:p>
             <a:fld id="{05D3A4E8-AB20-43C8-A6A8-E7249BC0FC39}" type="datetimeFigureOut">
               <a:rPr lang="en-US" smtClean="0"/>
-              <a:t>8/22/2020</a:t>
+              <a:t>8/29/2020</a:t>
             </a:fld>
             <a:endParaRPr lang="en-US"/>
           </a:p>
@@ -2344,7 +2337,7 @@
           <a:p>
             <a:fld id="{05D3A4E8-AB20-43C8-A6A8-E7249BC0FC39}" type="datetimeFigureOut">
               <a:rPr lang="en-US" smtClean="0"/>
-              <a:t>8/22/2020</a:t>
+              <a:t>8/29/2020</a:t>
             </a:fld>
             <a:endParaRPr lang="en-US"/>
           </a:p>
@@ -2485,7 +2478,7 @@
           <a:p>
             <a:fld id="{05D3A4E8-AB20-43C8-A6A8-E7249BC0FC39}" type="datetimeFigureOut">
               <a:rPr lang="en-US" smtClean="0"/>
-              <a:t>8/22/2020</a:t>
+              <a:t>8/29/2020</a:t>
             </a:fld>
             <a:endParaRPr lang="en-US"/>
           </a:p>
@@ -2598,7 +2591,7 @@
           <a:p>
             <a:fld id="{05D3A4E8-AB20-43C8-A6A8-E7249BC0FC39}" type="datetimeFigureOut">
               <a:rPr lang="en-US" smtClean="0"/>
-              <a:t>8/22/2020</a:t>
+              <a:t>8/29/2020</a:t>
             </a:fld>
             <a:endParaRPr lang="en-US"/>
           </a:p>
@@ -2909,7 +2902,7 @@
           <a:p>
             <a:fld id="{05D3A4E8-AB20-43C8-A6A8-E7249BC0FC39}" type="datetimeFigureOut">
               <a:rPr lang="en-US" smtClean="0"/>
-              <a:t>8/22/2020</a:t>
+              <a:t>8/29/2020</a:t>
             </a:fld>
             <a:endParaRPr lang="en-US"/>
           </a:p>
@@ -3197,7 +3190,7 @@
           <a:p>
             <a:fld id="{05D3A4E8-AB20-43C8-A6A8-E7249BC0FC39}" type="datetimeFigureOut">
               <a:rPr lang="en-US" smtClean="0"/>
-              <a:t>8/22/2020</a:t>
+              <a:t>8/29/2020</a:t>
             </a:fld>
             <a:endParaRPr lang="en-US"/>
           </a:p>
@@ -3438,7 +3431,7 @@
           <a:p>
             <a:fld id="{05D3A4E8-AB20-43C8-A6A8-E7249BC0FC39}" type="datetimeFigureOut">
               <a:rPr lang="en-US" smtClean="0"/>
-              <a:t>8/22/2020</a:t>
+              <a:t>8/29/2020</a:t>
             </a:fld>
             <a:endParaRPr lang="en-US"/>
           </a:p>
@@ -3901,7 +3894,15 @@
           <a:bodyPr/>
           <a:lstStyle/>
           <a:p>
-            <a:endParaRPr lang="en-US"/>
+            <a:r>
+              <a:rPr lang="en-US" dirty="0"/>
+              <a:t>Keywords: Keyword1, Keyword2, Keyword3, </a:t>
+            </a:r>
+            <a:r>
+              <a:rPr lang="en-US"/>
+              <a:t>Keyword4 Keyword5</a:t>
+            </a:r>
+            <a:endParaRPr lang="en-US" dirty="0"/>
           </a:p>
         </p:txBody>
       </p:sp>
@@ -3956,7 +3957,7 @@
           <a:bodyPr/>
           <a:lstStyle/>
           <a:p>
-            <a:endParaRPr lang="en-US"/>
+            <a:endParaRPr lang="en-US" dirty="0"/>
           </a:p>
         </p:txBody>
       </p:sp>
@@ -3981,7 +3982,45 @@
           <a:bodyPr/>
           <a:lstStyle/>
           <a:p>
-            <a:endParaRPr lang="en-US"/>
+            <a:pPr marL="0" indent="0">
+              <a:buNone/>
+            </a:pPr>
+            <a:endParaRPr lang="en-US" dirty="0"/>
+          </a:p>
+        </p:txBody>
+      </p:sp>
+      <p:sp>
+        <p:nvSpPr>
+          <p:cNvPr id="4" name="TextBox 3">
+            <a:extLst>
+              <a:ext uri="{FF2B5EF4-FFF2-40B4-BE49-F238E27FC236}">
+                <a16:creationId xmlns:a16="http://schemas.microsoft.com/office/drawing/2014/main" id="{1D14E3C5-1EA6-437C-B2C3-FA0FE7555BBF}"/>
+              </a:ext>
+            </a:extLst>
+          </p:cNvPr>
+          <p:cNvSpPr txBox="1"/>
+          <p:nvPr/>
+        </p:nvSpPr>
+        <p:spPr>
+          <a:xfrm>
+            <a:off x="707010" y="4242062"/>
+            <a:ext cx="2144370" cy="369332"/>
+          </a:xfrm>
+          <a:prstGeom prst="rect">
+            <a:avLst/>
+          </a:prstGeom>
+          <a:noFill/>
+        </p:spPr>
+        <p:txBody>
+          <a:bodyPr wrap="none" rtlCol="0">
+            <a:spAutoFit/>
+          </a:bodyPr>
+          <a:lstStyle/>
+          <a:p>
+            <a:r>
+              <a:rPr lang="en-US" dirty="0"/>
+              <a:t>Keywords: Keyword3</a:t>
+            </a:r>
           </a:p>
         </p:txBody>
       </p:sp>

</xml_diff>